<commit_message>
Update pentru documentatie si prezentare
</commit_message>
<xml_diff>
--- a/ProiectSincretic_Pitiorka.pptx
+++ b/ProiectSincretic_Pitiorka.pptx
@@ -5,7 +5,7 @@
     <p:sldMasterId id="2147483660" r:id="rId1"/>
   </p:sldMasterIdLst>
   <p:notesMasterIdLst>
-    <p:notesMasterId r:id="rId13"/>
+    <p:notesMasterId r:id="rId14"/>
   </p:notesMasterIdLst>
   <p:sldIdLst>
     <p:sldId id="256" r:id="rId2"/>
@@ -16,9 +16,10 @@
     <p:sldId id="261" r:id="rId7"/>
     <p:sldId id="262" r:id="rId8"/>
     <p:sldId id="263" r:id="rId9"/>
-    <p:sldId id="266" r:id="rId10"/>
-    <p:sldId id="264" r:id="rId11"/>
-    <p:sldId id="265" r:id="rId12"/>
+    <p:sldId id="267" r:id="rId10"/>
+    <p:sldId id="266" r:id="rId11"/>
+    <p:sldId id="264" r:id="rId12"/>
+    <p:sldId id="265" r:id="rId13"/>
   </p:sldIdLst>
   <p:sldSz cx="12192000" cy="6858000"/>
   <p:notesSz cx="6858000" cy="9144000"/>
@@ -207,7 +208,7 @@
           <a:p>
             <a:fld id="{6189A707-F12B-4A0F-9956-BDB12E9E712D}" type="datetimeFigureOut">
               <a:rPr lang="en-GB" smtClean="0"/>
-              <a:t>21/01/2025</a:t>
+              <a:t>22/01/2025</a:t>
             </a:fld>
             <a:endParaRPr lang="en-GB"/>
           </a:p>
@@ -609,7 +610,7 @@
           <a:noFill/>
           <a:extLst>
             <a:ext uri="{909E8E84-426E-40dd-AFC4-6F175D3DCCD1}">
-              <a14:hiddenFill xmlns="" xmlns:a14="http://schemas.microsoft.com/office/drawing/2010/main">
+              <a14:hiddenFill xmlns:a14="http://schemas.microsoft.com/office/drawing/2010/main" xmlns="">
                 <a:solidFill>
                   <a:srgbClr val="FFFFFF"/>
                 </a:solidFill>
@@ -669,7 +670,7 @@
             </a:ln>
             <a:extLst>
               <a:ext uri="{91240B29-F687-4f45-9708-019B960494DF}">
-                <a14:hiddenLine xmlns="" xmlns:a14="http://schemas.microsoft.com/office/drawing/2010/main" w="9525">
+                <a14:hiddenLine xmlns:a14="http://schemas.microsoft.com/office/drawing/2010/main" xmlns="" w="9525">
                   <a:solidFill>
                     <a:srgbClr val="000000"/>
                   </a:solidFill>
@@ -759,7 +760,7 @@
             </a:ln>
             <a:extLst>
               <a:ext uri="{91240B29-F687-4f45-9708-019B960494DF}">
-                <a14:hiddenLine xmlns="" xmlns:a14="http://schemas.microsoft.com/office/drawing/2010/main" w="9525">
+                <a14:hiddenLine xmlns:a14="http://schemas.microsoft.com/office/drawing/2010/main" xmlns="" w="9525">
                   <a:solidFill>
                     <a:srgbClr val="000000"/>
                   </a:solidFill>
@@ -849,7 +850,7 @@
             </a:ln>
             <a:extLst>
               <a:ext uri="{91240B29-F687-4f45-9708-019B960494DF}">
-                <a14:hiddenLine xmlns="" xmlns:a14="http://schemas.microsoft.com/office/drawing/2010/main" w="9525">
+                <a14:hiddenLine xmlns:a14="http://schemas.microsoft.com/office/drawing/2010/main" xmlns="" w="9525">
                   <a:solidFill>
                     <a:srgbClr val="000000"/>
                   </a:solidFill>
@@ -883,7 +884,7 @@
             </a:ln>
             <a:extLst>
               <a:ext uri="{91240B29-F687-4f45-9708-019B960494DF}">
-                <a14:hiddenLine xmlns="" xmlns:a14="http://schemas.microsoft.com/office/drawing/2010/main" w="9525">
+                <a14:hiddenLine xmlns:a14="http://schemas.microsoft.com/office/drawing/2010/main" xmlns="" w="9525">
                   <a:solidFill>
                     <a:srgbClr val="000000"/>
                   </a:solidFill>
@@ -973,7 +974,7 @@
             </a:ln>
             <a:extLst>
               <a:ext uri="{91240B29-F687-4f45-9708-019B960494DF}">
-                <a14:hiddenLine xmlns="" xmlns:a14="http://schemas.microsoft.com/office/drawing/2010/main" w="9525">
+                <a14:hiddenLine xmlns:a14="http://schemas.microsoft.com/office/drawing/2010/main" xmlns="" w="9525">
                   <a:solidFill>
                     <a:srgbClr val="000000"/>
                   </a:solidFill>
@@ -1035,7 +1036,7 @@
             </a:ln>
             <a:extLst>
               <a:ext uri="{91240B29-F687-4f45-9708-019B960494DF}">
-                <a14:hiddenLine xmlns="" xmlns:a14="http://schemas.microsoft.com/office/drawing/2010/main" w="9525">
+                <a14:hiddenLine xmlns:a14="http://schemas.microsoft.com/office/drawing/2010/main" xmlns="" w="9525">
                   <a:solidFill>
                     <a:srgbClr val="000000"/>
                   </a:solidFill>
@@ -1097,7 +1098,7 @@
             </a:ln>
             <a:extLst>
               <a:ext uri="{91240B29-F687-4f45-9708-019B960494DF}">
-                <a14:hiddenLine xmlns="" xmlns:a14="http://schemas.microsoft.com/office/drawing/2010/main" w="9525">
+                <a14:hiddenLine xmlns:a14="http://schemas.microsoft.com/office/drawing/2010/main" xmlns="" w="9525">
                   <a:solidFill>
                     <a:srgbClr val="000000"/>
                   </a:solidFill>
@@ -1187,7 +1188,7 @@
             </a:ln>
             <a:extLst>
               <a:ext uri="{91240B29-F687-4f45-9708-019B960494DF}">
-                <a14:hiddenLine xmlns="" xmlns:a14="http://schemas.microsoft.com/office/drawing/2010/main" w="9525">
+                <a14:hiddenLine xmlns:a14="http://schemas.microsoft.com/office/drawing/2010/main" xmlns="" w="9525">
                   <a:solidFill>
                     <a:srgbClr val="000000"/>
                   </a:solidFill>
@@ -1249,7 +1250,7 @@
             </a:ln>
             <a:extLst>
               <a:ext uri="{91240B29-F687-4f45-9708-019B960494DF}">
-                <a14:hiddenLine xmlns="" xmlns:a14="http://schemas.microsoft.com/office/drawing/2010/main" w="9525">
+                <a14:hiddenLine xmlns:a14="http://schemas.microsoft.com/office/drawing/2010/main" xmlns="" w="9525">
                   <a:solidFill>
                     <a:srgbClr val="000000"/>
                   </a:solidFill>
@@ -1311,7 +1312,7 @@
             </a:ln>
             <a:extLst>
               <a:ext uri="{91240B29-F687-4f45-9708-019B960494DF}">
-                <a14:hiddenLine xmlns="" xmlns:a14="http://schemas.microsoft.com/office/drawing/2010/main" w="9525">
+                <a14:hiddenLine xmlns:a14="http://schemas.microsoft.com/office/drawing/2010/main" xmlns="" w="9525">
                   <a:solidFill>
                     <a:srgbClr val="000000"/>
                   </a:solidFill>
@@ -1401,7 +1402,7 @@
             </a:ln>
             <a:extLst>
               <a:ext uri="{91240B29-F687-4f45-9708-019B960494DF}">
-                <a14:hiddenLine xmlns="" xmlns:a14="http://schemas.microsoft.com/office/drawing/2010/main" w="9525">
+                <a14:hiddenLine xmlns:a14="http://schemas.microsoft.com/office/drawing/2010/main" xmlns="" w="9525">
                   <a:solidFill>
                     <a:srgbClr val="000000"/>
                   </a:solidFill>
@@ -1491,7 +1492,7 @@
             </a:ln>
             <a:extLst>
               <a:ext uri="{91240B29-F687-4f45-9708-019B960494DF}">
-                <a14:hiddenLine xmlns="" xmlns:a14="http://schemas.microsoft.com/office/drawing/2010/main" w="9525">
+                <a14:hiddenLine xmlns:a14="http://schemas.microsoft.com/office/drawing/2010/main" xmlns="" w="9525">
                   <a:solidFill>
                     <a:srgbClr val="000000"/>
                   </a:solidFill>
@@ -1553,7 +1554,7 @@
             </a:ln>
             <a:extLst>
               <a:ext uri="{91240B29-F687-4f45-9708-019B960494DF}">
-                <a14:hiddenLine xmlns="" xmlns:a14="http://schemas.microsoft.com/office/drawing/2010/main" w="9525">
+                <a14:hiddenLine xmlns:a14="http://schemas.microsoft.com/office/drawing/2010/main" xmlns="" w="9525">
                   <a:solidFill>
                     <a:srgbClr val="000000"/>
                   </a:solidFill>
@@ -1663,7 +1664,7 @@
             </a:ln>
             <a:extLst>
               <a:ext uri="{91240B29-F687-4f45-9708-019B960494DF}">
-                <a14:hiddenLine xmlns="" xmlns:a14="http://schemas.microsoft.com/office/drawing/2010/main" w="9525">
+                <a14:hiddenLine xmlns:a14="http://schemas.microsoft.com/office/drawing/2010/main" xmlns="" w="9525">
                   <a:solidFill>
                     <a:srgbClr val="000000"/>
                   </a:solidFill>
@@ -1725,7 +1726,7 @@
             </a:ln>
             <a:extLst>
               <a:ext uri="{91240B29-F687-4f45-9708-019B960494DF}">
-                <a14:hiddenLine xmlns="" xmlns:a14="http://schemas.microsoft.com/office/drawing/2010/main" w="9525">
+                <a14:hiddenLine xmlns:a14="http://schemas.microsoft.com/office/drawing/2010/main" xmlns="" w="9525">
                   <a:solidFill>
                     <a:srgbClr val="000000"/>
                   </a:solidFill>
@@ -1815,7 +1816,7 @@
             </a:ln>
             <a:extLst>
               <a:ext uri="{91240B29-F687-4f45-9708-019B960494DF}">
-                <a14:hiddenLine xmlns="" xmlns:a14="http://schemas.microsoft.com/office/drawing/2010/main" w="9525">
+                <a14:hiddenLine xmlns:a14="http://schemas.microsoft.com/office/drawing/2010/main" xmlns="" w="9525">
                   <a:solidFill>
                     <a:srgbClr val="000000"/>
                   </a:solidFill>
@@ -1905,7 +1906,7 @@
             </a:ln>
             <a:extLst>
               <a:ext uri="{91240B29-F687-4f45-9708-019B960494DF}">
-                <a14:hiddenLine xmlns="" xmlns:a14="http://schemas.microsoft.com/office/drawing/2010/main" w="9525">
+                <a14:hiddenLine xmlns:a14="http://schemas.microsoft.com/office/drawing/2010/main" xmlns="" w="9525">
                   <a:solidFill>
                     <a:srgbClr val="000000"/>
                   </a:solidFill>
@@ -1967,7 +1968,7 @@
             </a:ln>
             <a:extLst>
               <a:ext uri="{91240B29-F687-4f45-9708-019B960494DF}">
-                <a14:hiddenLine xmlns="" xmlns:a14="http://schemas.microsoft.com/office/drawing/2010/main" w="9525">
+                <a14:hiddenLine xmlns:a14="http://schemas.microsoft.com/office/drawing/2010/main" xmlns="" w="9525">
                   <a:solidFill>
                     <a:srgbClr val="000000"/>
                   </a:solidFill>
@@ -2057,7 +2058,7 @@
             </a:ln>
             <a:extLst>
               <a:ext uri="{91240B29-F687-4f45-9708-019B960494DF}">
-                <a14:hiddenLine xmlns="" xmlns:a14="http://schemas.microsoft.com/office/drawing/2010/main" w="9525">
+                <a14:hiddenLine xmlns:a14="http://schemas.microsoft.com/office/drawing/2010/main" xmlns="" w="9525">
                   <a:solidFill>
                     <a:srgbClr val="000000"/>
                   </a:solidFill>
@@ -2147,7 +2148,7 @@
             </a:ln>
             <a:extLst>
               <a:ext uri="{91240B29-F687-4f45-9708-019B960494DF}">
-                <a14:hiddenLine xmlns="" xmlns:a14="http://schemas.microsoft.com/office/drawing/2010/main" w="9525">
+                <a14:hiddenLine xmlns:a14="http://schemas.microsoft.com/office/drawing/2010/main" xmlns="" w="9525">
                   <a:solidFill>
                     <a:srgbClr val="000000"/>
                   </a:solidFill>
@@ -2203,7 +2204,7 @@
             </a:ln>
             <a:extLst>
               <a:ext uri="{91240B29-F687-4f45-9708-019B960494DF}">
-                <a14:hiddenLine xmlns="" xmlns:a14="http://schemas.microsoft.com/office/drawing/2010/main" w="9525">
+                <a14:hiddenLine xmlns:a14="http://schemas.microsoft.com/office/drawing/2010/main" xmlns="" w="9525">
                   <a:solidFill>
                     <a:srgbClr val="000000"/>
                   </a:solidFill>
@@ -2293,7 +2294,7 @@
             </a:ln>
             <a:extLst>
               <a:ext uri="{91240B29-F687-4f45-9708-019B960494DF}">
-                <a14:hiddenLine xmlns="" xmlns:a14="http://schemas.microsoft.com/office/drawing/2010/main" w="9525">
+                <a14:hiddenLine xmlns:a14="http://schemas.microsoft.com/office/drawing/2010/main" xmlns="" w="9525">
                   <a:solidFill>
                     <a:srgbClr val="000000"/>
                   </a:solidFill>
@@ -2349,7 +2350,7 @@
             </a:ln>
             <a:extLst>
               <a:ext uri="{91240B29-F687-4f45-9708-019B960494DF}">
-                <a14:hiddenLine xmlns="" xmlns:a14="http://schemas.microsoft.com/office/drawing/2010/main" w="9525">
+                <a14:hiddenLine xmlns:a14="http://schemas.microsoft.com/office/drawing/2010/main" xmlns="" w="9525">
                   <a:solidFill>
                     <a:srgbClr val="000000"/>
                   </a:solidFill>
@@ -2439,7 +2440,7 @@
             </a:ln>
             <a:extLst>
               <a:ext uri="{91240B29-F687-4f45-9708-019B960494DF}">
-                <a14:hiddenLine xmlns="" xmlns:a14="http://schemas.microsoft.com/office/drawing/2010/main" w="9525">
+                <a14:hiddenLine xmlns:a14="http://schemas.microsoft.com/office/drawing/2010/main" xmlns="" w="9525">
                   <a:solidFill>
                     <a:srgbClr val="000000"/>
                   </a:solidFill>
@@ -2507,7 +2508,7 @@
             </a:ln>
             <a:extLst>
               <a:ext uri="{91240B29-F687-4f45-9708-019B960494DF}">
-                <a14:hiddenLine xmlns="" xmlns:a14="http://schemas.microsoft.com/office/drawing/2010/main" w="9525">
+                <a14:hiddenLine xmlns:a14="http://schemas.microsoft.com/office/drawing/2010/main" xmlns="" w="9525">
                   <a:solidFill>
                     <a:srgbClr val="000000"/>
                   </a:solidFill>
@@ -2597,7 +2598,7 @@
             </a:ln>
             <a:extLst>
               <a:ext uri="{91240B29-F687-4f45-9708-019B960494DF}">
-                <a14:hiddenLine xmlns="" xmlns:a14="http://schemas.microsoft.com/office/drawing/2010/main" w="9525">
+                <a14:hiddenLine xmlns:a14="http://schemas.microsoft.com/office/drawing/2010/main" xmlns="" w="9525">
                   <a:solidFill>
                     <a:srgbClr val="000000"/>
                   </a:solidFill>
@@ -2665,7 +2666,7 @@
             </a:ln>
             <a:extLst>
               <a:ext uri="{91240B29-F687-4f45-9708-019B960494DF}">
-                <a14:hiddenLine xmlns="" xmlns:a14="http://schemas.microsoft.com/office/drawing/2010/main" w="9525">
+                <a14:hiddenLine xmlns:a14="http://schemas.microsoft.com/office/drawing/2010/main" xmlns="" w="9525">
                   <a:solidFill>
                     <a:srgbClr val="000000"/>
                   </a:solidFill>
@@ -2755,7 +2756,7 @@
             </a:ln>
             <a:extLst>
               <a:ext uri="{91240B29-F687-4f45-9708-019B960494DF}">
-                <a14:hiddenLine xmlns="" xmlns:a14="http://schemas.microsoft.com/office/drawing/2010/main" w="9525">
+                <a14:hiddenLine xmlns:a14="http://schemas.microsoft.com/office/drawing/2010/main" xmlns="" w="9525">
                   <a:solidFill>
                     <a:srgbClr val="000000"/>
                   </a:solidFill>
@@ -2789,7 +2790,7 @@
             </a:ln>
             <a:extLst>
               <a:ext uri="{91240B29-F687-4f45-9708-019B960494DF}">
-                <a14:hiddenLine xmlns="" xmlns:a14="http://schemas.microsoft.com/office/drawing/2010/main" w="9525">
+                <a14:hiddenLine xmlns:a14="http://schemas.microsoft.com/office/drawing/2010/main" xmlns="" w="9525">
                   <a:solidFill>
                     <a:srgbClr val="000000"/>
                   </a:solidFill>
@@ -2879,7 +2880,7 @@
             </a:ln>
             <a:extLst>
               <a:ext uri="{91240B29-F687-4f45-9708-019B960494DF}">
-                <a14:hiddenLine xmlns="" xmlns:a14="http://schemas.microsoft.com/office/drawing/2010/main" w="9525">
+                <a14:hiddenLine xmlns:a14="http://schemas.microsoft.com/office/drawing/2010/main" xmlns="" w="9525">
                   <a:solidFill>
                     <a:srgbClr val="000000"/>
                   </a:solidFill>
@@ -2941,7 +2942,7 @@
             </a:ln>
             <a:extLst>
               <a:ext uri="{91240B29-F687-4f45-9708-019B960494DF}">
-                <a14:hiddenLine xmlns="" xmlns:a14="http://schemas.microsoft.com/office/drawing/2010/main" w="9525">
+                <a14:hiddenLine xmlns:a14="http://schemas.microsoft.com/office/drawing/2010/main" xmlns="" w="9525">
                   <a:solidFill>
                     <a:srgbClr val="000000"/>
                   </a:solidFill>
@@ -3003,7 +3004,7 @@
             </a:ln>
             <a:extLst>
               <a:ext uri="{91240B29-F687-4f45-9708-019B960494DF}">
-                <a14:hiddenLine xmlns="" xmlns:a14="http://schemas.microsoft.com/office/drawing/2010/main" w="9525">
+                <a14:hiddenLine xmlns:a14="http://schemas.microsoft.com/office/drawing/2010/main" xmlns="" w="9525">
                   <a:solidFill>
                     <a:srgbClr val="000000"/>
                   </a:solidFill>
@@ -3093,7 +3094,7 @@
             </a:ln>
             <a:extLst>
               <a:ext uri="{91240B29-F687-4f45-9708-019B960494DF}">
-                <a14:hiddenLine xmlns="" xmlns:a14="http://schemas.microsoft.com/office/drawing/2010/main" w="9525">
+                <a14:hiddenLine xmlns:a14="http://schemas.microsoft.com/office/drawing/2010/main" xmlns="" w="9525">
                   <a:solidFill>
                     <a:srgbClr val="000000"/>
                   </a:solidFill>
@@ -3161,7 +3162,7 @@
             </a:ln>
             <a:extLst>
               <a:ext uri="{91240B29-F687-4f45-9708-019B960494DF}">
-                <a14:hiddenLine xmlns="" xmlns:a14="http://schemas.microsoft.com/office/drawing/2010/main" w="9525">
+                <a14:hiddenLine xmlns:a14="http://schemas.microsoft.com/office/drawing/2010/main" xmlns="" w="9525">
                   <a:solidFill>
                     <a:srgbClr val="000000"/>
                   </a:solidFill>
@@ -3223,7 +3224,7 @@
             </a:ln>
             <a:extLst>
               <a:ext uri="{91240B29-F687-4f45-9708-019B960494DF}">
-                <a14:hiddenLine xmlns="" xmlns:a14="http://schemas.microsoft.com/office/drawing/2010/main" w="9525">
+                <a14:hiddenLine xmlns:a14="http://schemas.microsoft.com/office/drawing/2010/main" xmlns="" w="9525">
                   <a:solidFill>
                     <a:srgbClr val="000000"/>
                   </a:solidFill>
@@ -3313,7 +3314,7 @@
             </a:ln>
             <a:extLst>
               <a:ext uri="{91240B29-F687-4f45-9708-019B960494DF}">
-                <a14:hiddenLine xmlns="" xmlns:a14="http://schemas.microsoft.com/office/drawing/2010/main" w="9525">
+                <a14:hiddenLine xmlns:a14="http://schemas.microsoft.com/office/drawing/2010/main" xmlns="" w="9525">
                   <a:solidFill>
                     <a:srgbClr val="000000"/>
                   </a:solidFill>
@@ -3375,7 +3376,7 @@
             </a:ln>
             <a:extLst>
               <a:ext uri="{91240B29-F687-4f45-9708-019B960494DF}">
-                <a14:hiddenLine xmlns="" xmlns:a14="http://schemas.microsoft.com/office/drawing/2010/main" w="9525">
+                <a14:hiddenLine xmlns:a14="http://schemas.microsoft.com/office/drawing/2010/main" xmlns="" w="9525">
                   <a:solidFill>
                     <a:srgbClr val="000000"/>
                   </a:solidFill>
@@ -3465,7 +3466,7 @@
             </a:ln>
             <a:extLst>
               <a:ext uri="{91240B29-F687-4f45-9708-019B960494DF}">
-                <a14:hiddenLine xmlns="" xmlns:a14="http://schemas.microsoft.com/office/drawing/2010/main" w="9525">
+                <a14:hiddenLine xmlns:a14="http://schemas.microsoft.com/office/drawing/2010/main" xmlns="" w="9525">
                   <a:solidFill>
                     <a:srgbClr val="000000"/>
                   </a:solidFill>
@@ -3527,7 +3528,7 @@
             </a:ln>
             <a:extLst>
               <a:ext uri="{91240B29-F687-4f45-9708-019B960494DF}">
-                <a14:hiddenLine xmlns="" xmlns:a14="http://schemas.microsoft.com/office/drawing/2010/main" w="9525">
+                <a14:hiddenLine xmlns:a14="http://schemas.microsoft.com/office/drawing/2010/main" xmlns="" w="9525">
                   <a:solidFill>
                     <a:srgbClr val="000000"/>
                   </a:solidFill>
@@ -3617,7 +3618,7 @@
             </a:ln>
             <a:extLst>
               <a:ext uri="{91240B29-F687-4f45-9708-019B960494DF}">
-                <a14:hiddenLine xmlns="" xmlns:a14="http://schemas.microsoft.com/office/drawing/2010/main" w="9525">
+                <a14:hiddenLine xmlns:a14="http://schemas.microsoft.com/office/drawing/2010/main" xmlns="" w="9525">
                   <a:solidFill>
                     <a:srgbClr val="000000"/>
                   </a:solidFill>
@@ -3651,7 +3652,7 @@
             </a:ln>
             <a:extLst>
               <a:ext uri="{91240B29-F687-4f45-9708-019B960494DF}">
-                <a14:hiddenLine xmlns="" xmlns:a14="http://schemas.microsoft.com/office/drawing/2010/main" w="9525">
+                <a14:hiddenLine xmlns:a14="http://schemas.microsoft.com/office/drawing/2010/main" xmlns="" w="9525">
                   <a:solidFill>
                     <a:srgbClr val="000000"/>
                   </a:solidFill>
@@ -3716,7 +3717,7 @@
             </a:ln>
             <a:extLst>
               <a:ext uri="{91240B29-F687-4f45-9708-019B960494DF}">
-                <a14:hiddenLine xmlns="" xmlns:a14="http://schemas.microsoft.com/office/drawing/2010/main" w="9525">
+                <a14:hiddenLine xmlns:a14="http://schemas.microsoft.com/office/drawing/2010/main" xmlns="" w="9525">
                   <a:solidFill>
                     <a:srgbClr val="000000"/>
                   </a:solidFill>
@@ -3806,7 +3807,7 @@
             </a:ln>
             <a:extLst>
               <a:ext uri="{91240B29-F687-4f45-9708-019B960494DF}">
-                <a14:hiddenLine xmlns="" xmlns:a14="http://schemas.microsoft.com/office/drawing/2010/main" w="9525">
+                <a14:hiddenLine xmlns:a14="http://schemas.microsoft.com/office/drawing/2010/main" xmlns="" w="9525">
                   <a:solidFill>
                     <a:srgbClr val="000000"/>
                   </a:solidFill>
@@ -3868,7 +3869,7 @@
             </a:ln>
             <a:extLst>
               <a:ext uri="{91240B29-F687-4f45-9708-019B960494DF}">
-                <a14:hiddenLine xmlns="" xmlns:a14="http://schemas.microsoft.com/office/drawing/2010/main" w="9525">
+                <a14:hiddenLine xmlns:a14="http://schemas.microsoft.com/office/drawing/2010/main" xmlns="" w="9525">
                   <a:solidFill>
                     <a:srgbClr val="000000"/>
                   </a:solidFill>
@@ -3958,7 +3959,7 @@
             </a:ln>
             <a:extLst>
               <a:ext uri="{91240B29-F687-4f45-9708-019B960494DF}">
-                <a14:hiddenLine xmlns="" xmlns:a14="http://schemas.microsoft.com/office/drawing/2010/main" w="9525">
+                <a14:hiddenLine xmlns:a14="http://schemas.microsoft.com/office/drawing/2010/main" xmlns="" w="9525">
                   <a:solidFill>
                     <a:srgbClr val="000000"/>
                   </a:solidFill>
@@ -4048,7 +4049,7 @@
             </a:ln>
             <a:extLst>
               <a:ext uri="{91240B29-F687-4f45-9708-019B960494DF}">
-                <a14:hiddenLine xmlns="" xmlns:a14="http://schemas.microsoft.com/office/drawing/2010/main" w="9525">
+                <a14:hiddenLine xmlns:a14="http://schemas.microsoft.com/office/drawing/2010/main" xmlns="" w="9525">
                   <a:solidFill>
                     <a:srgbClr val="000000"/>
                   </a:solidFill>
@@ -4113,7 +4114,7 @@
             </a:ln>
             <a:extLst>
               <a:ext uri="{91240B29-F687-4f45-9708-019B960494DF}">
-                <a14:hiddenLine xmlns="" xmlns:a14="http://schemas.microsoft.com/office/drawing/2010/main" w="9525">
+                <a14:hiddenLine xmlns:a14="http://schemas.microsoft.com/office/drawing/2010/main" xmlns="" w="9525">
                   <a:solidFill>
                     <a:srgbClr val="000000"/>
                   </a:solidFill>
@@ -4175,7 +4176,7 @@
             </a:ln>
             <a:extLst>
               <a:ext uri="{91240B29-F687-4f45-9708-019B960494DF}">
-                <a14:hiddenLine xmlns="" xmlns:a14="http://schemas.microsoft.com/office/drawing/2010/main" w="9525">
+                <a14:hiddenLine xmlns:a14="http://schemas.microsoft.com/office/drawing/2010/main" xmlns="" w="9525">
                   <a:solidFill>
                     <a:srgbClr val="000000"/>
                   </a:solidFill>
@@ -4265,7 +4266,7 @@
             </a:ln>
             <a:extLst>
               <a:ext uri="{91240B29-F687-4f45-9708-019B960494DF}">
-                <a14:hiddenLine xmlns="" xmlns:a14="http://schemas.microsoft.com/office/drawing/2010/main" w="9525">
+                <a14:hiddenLine xmlns:a14="http://schemas.microsoft.com/office/drawing/2010/main" xmlns="" w="9525">
                   <a:solidFill>
                     <a:srgbClr val="000000"/>
                   </a:solidFill>
@@ -4355,7 +4356,7 @@
             </a:ln>
             <a:extLst>
               <a:ext uri="{91240B29-F687-4f45-9708-019B960494DF}">
-                <a14:hiddenLine xmlns="" xmlns:a14="http://schemas.microsoft.com/office/drawing/2010/main" w="9525">
+                <a14:hiddenLine xmlns:a14="http://schemas.microsoft.com/office/drawing/2010/main" xmlns="" w="9525">
                   <a:solidFill>
                     <a:srgbClr val="000000"/>
                   </a:solidFill>
@@ -4417,7 +4418,7 @@
             </a:ln>
             <a:extLst>
               <a:ext uri="{91240B29-F687-4f45-9708-019B960494DF}">
-                <a14:hiddenLine xmlns="" xmlns:a14="http://schemas.microsoft.com/office/drawing/2010/main" w="9525">
+                <a14:hiddenLine xmlns:a14="http://schemas.microsoft.com/office/drawing/2010/main" xmlns="" w="9525">
                   <a:solidFill>
                     <a:srgbClr val="000000"/>
                   </a:solidFill>
@@ -4537,7 +4538,7 @@
             </a:ln>
             <a:extLst>
               <a:ext uri="{91240B29-F687-4f45-9708-019B960494DF}">
-                <a14:hiddenLine xmlns="" xmlns:a14="http://schemas.microsoft.com/office/drawing/2010/main" w="9525">
+                <a14:hiddenLine xmlns:a14="http://schemas.microsoft.com/office/drawing/2010/main" xmlns="" w="9525">
                   <a:solidFill>
                     <a:srgbClr val="000000"/>
                   </a:solidFill>
@@ -4605,7 +4606,7 @@
             </a:ln>
             <a:extLst>
               <a:ext uri="{91240B29-F687-4f45-9708-019B960494DF}">
-                <a14:hiddenLine xmlns="" xmlns:a14="http://schemas.microsoft.com/office/drawing/2010/main" w="9525">
+                <a14:hiddenLine xmlns:a14="http://schemas.microsoft.com/office/drawing/2010/main" xmlns="" w="9525">
                   <a:solidFill>
                     <a:srgbClr val="000000"/>
                   </a:solidFill>
@@ -4695,7 +4696,7 @@
             </a:ln>
             <a:extLst>
               <a:ext uri="{91240B29-F687-4f45-9708-019B960494DF}">
-                <a14:hiddenLine xmlns="" xmlns:a14="http://schemas.microsoft.com/office/drawing/2010/main" w="9525">
+                <a14:hiddenLine xmlns:a14="http://schemas.microsoft.com/office/drawing/2010/main" xmlns="" w="9525">
                   <a:solidFill>
                     <a:srgbClr val="000000"/>
                   </a:solidFill>
@@ -4835,7 +4836,7 @@
           <a:p>
             <a:fld id="{FDA64800-81E6-4B3F-A854-A27E596CDA46}" type="datetimeFigureOut">
               <a:rPr lang="en-GB" smtClean="0"/>
-              <a:t>21/01/2025</a:t>
+              <a:t>22/01/2025</a:t>
             </a:fld>
             <a:endParaRPr lang="en-GB"/>
           </a:p>
@@ -5102,7 +5103,7 @@
           <a:p>
             <a:fld id="{FDA64800-81E6-4B3F-A854-A27E596CDA46}" type="datetimeFigureOut">
               <a:rPr lang="en-GB" smtClean="0"/>
-              <a:t>21/01/2025</a:t>
+              <a:t>22/01/2025</a:t>
             </a:fld>
             <a:endParaRPr lang="en-GB"/>
           </a:p>
@@ -5298,7 +5299,7 @@
           <a:p>
             <a:fld id="{FDA64800-81E6-4B3F-A854-A27E596CDA46}" type="datetimeFigureOut">
               <a:rPr lang="en-GB" smtClean="0"/>
-              <a:t>21/01/2025</a:t>
+              <a:t>22/01/2025</a:t>
             </a:fld>
             <a:endParaRPr lang="en-GB"/>
           </a:p>
@@ -5561,7 +5562,7 @@
           <a:p>
             <a:fld id="{FDA64800-81E6-4B3F-A854-A27E596CDA46}" type="datetimeFigureOut">
               <a:rPr lang="en-GB" smtClean="0"/>
-              <a:t>21/01/2025</a:t>
+              <a:t>22/01/2025</a:t>
             </a:fld>
             <a:endParaRPr lang="en-GB"/>
           </a:p>
@@ -5995,7 +5996,7 @@
           <a:p>
             <a:fld id="{FDA64800-81E6-4B3F-A854-A27E596CDA46}" type="datetimeFigureOut">
               <a:rPr lang="en-GB" smtClean="0"/>
-              <a:t>21/01/2025</a:t>
+              <a:t>22/01/2025</a:t>
             </a:fld>
             <a:endParaRPr lang="en-GB"/>
           </a:p>
@@ -6541,7 +6542,7 @@
           <a:p>
             <a:fld id="{FDA64800-81E6-4B3F-A854-A27E596CDA46}" type="datetimeFigureOut">
               <a:rPr lang="en-GB" smtClean="0"/>
-              <a:t>21/01/2025</a:t>
+              <a:t>22/01/2025</a:t>
             </a:fld>
             <a:endParaRPr lang="en-GB"/>
           </a:p>
@@ -7261,7 +7262,7 @@
           <a:p>
             <a:fld id="{FDA64800-81E6-4B3F-A854-A27E596CDA46}" type="datetimeFigureOut">
               <a:rPr lang="en-GB" smtClean="0"/>
-              <a:t>21/01/2025</a:t>
+              <a:t>22/01/2025</a:t>
             </a:fld>
             <a:endParaRPr lang="en-GB"/>
           </a:p>
@@ -7431,7 +7432,7 @@
           <a:p>
             <a:fld id="{FDA64800-81E6-4B3F-A854-A27E596CDA46}" type="datetimeFigureOut">
               <a:rPr lang="en-GB" smtClean="0"/>
-              <a:t>21/01/2025</a:t>
+              <a:t>22/01/2025</a:t>
             </a:fld>
             <a:endParaRPr lang="en-GB"/>
           </a:p>
@@ -7611,7 +7612,7 @@
           <a:p>
             <a:fld id="{FDA64800-81E6-4B3F-A854-A27E596CDA46}" type="datetimeFigureOut">
               <a:rPr lang="en-GB" smtClean="0"/>
-              <a:t>21/01/2025</a:t>
+              <a:t>22/01/2025</a:t>
             </a:fld>
             <a:endParaRPr lang="en-GB"/>
           </a:p>
@@ -7781,7 +7782,7 @@
           <a:p>
             <a:fld id="{FDA64800-81E6-4B3F-A854-A27E596CDA46}" type="datetimeFigureOut">
               <a:rPr lang="en-GB" smtClean="0"/>
-              <a:t>21/01/2025</a:t>
+              <a:t>22/01/2025</a:t>
             </a:fld>
             <a:endParaRPr lang="en-GB"/>
           </a:p>
@@ -8031,7 +8032,7 @@
           <a:p>
             <a:fld id="{FDA64800-81E6-4B3F-A854-A27E596CDA46}" type="datetimeFigureOut">
               <a:rPr lang="en-GB" smtClean="0"/>
-              <a:t>21/01/2025</a:t>
+              <a:t>22/01/2025</a:t>
             </a:fld>
             <a:endParaRPr lang="en-GB"/>
           </a:p>
@@ -8263,7 +8264,7 @@
           <a:p>
             <a:fld id="{FDA64800-81E6-4B3F-A854-A27E596CDA46}" type="datetimeFigureOut">
               <a:rPr lang="en-GB" smtClean="0"/>
-              <a:t>21/01/2025</a:t>
+              <a:t>22/01/2025</a:t>
             </a:fld>
             <a:endParaRPr lang="en-GB"/>
           </a:p>
@@ -8644,7 +8645,7 @@
           <a:p>
             <a:fld id="{FDA64800-81E6-4B3F-A854-A27E596CDA46}" type="datetimeFigureOut">
               <a:rPr lang="en-GB" smtClean="0"/>
-              <a:t>21/01/2025</a:t>
+              <a:t>22/01/2025</a:t>
             </a:fld>
             <a:endParaRPr lang="en-GB"/>
           </a:p>
@@ -8762,7 +8763,7 @@
           <a:p>
             <a:fld id="{FDA64800-81E6-4B3F-A854-A27E596CDA46}" type="datetimeFigureOut">
               <a:rPr lang="en-GB" smtClean="0"/>
-              <a:t>21/01/2025</a:t>
+              <a:t>22/01/2025</a:t>
             </a:fld>
             <a:endParaRPr lang="en-GB"/>
           </a:p>
@@ -8857,7 +8858,7 @@
           <a:p>
             <a:fld id="{FDA64800-81E6-4B3F-A854-A27E596CDA46}" type="datetimeFigureOut">
               <a:rPr lang="en-GB" smtClean="0"/>
-              <a:t>21/01/2025</a:t>
+              <a:t>22/01/2025</a:t>
             </a:fld>
             <a:endParaRPr lang="en-GB"/>
           </a:p>
@@ -9106,7 +9107,7 @@
           <a:p>
             <a:fld id="{FDA64800-81E6-4B3F-A854-A27E596CDA46}" type="datetimeFigureOut">
               <a:rPr lang="en-GB" smtClean="0"/>
-              <a:t>21/01/2025</a:t>
+              <a:t>22/01/2025</a:t>
             </a:fld>
             <a:endParaRPr lang="en-GB"/>
           </a:p>
@@ -9386,7 +9387,7 @@
           <a:p>
             <a:fld id="{FDA64800-81E6-4B3F-A854-A27E596CDA46}" type="datetimeFigureOut">
               <a:rPr lang="en-GB" smtClean="0"/>
-              <a:t>21/01/2025</a:t>
+              <a:t>22/01/2025</a:t>
             </a:fld>
             <a:endParaRPr lang="en-GB"/>
           </a:p>
@@ -9502,7 +9503,7 @@
           <a:noFill/>
           <a:extLst>
             <a:ext uri="{909E8E84-426E-40dd-AFC4-6F175D3DCCD1}">
-              <a14:hiddenFill xmlns="" xmlns:a14="http://schemas.microsoft.com/office/drawing/2010/main">
+              <a14:hiddenFill xmlns:a14="http://schemas.microsoft.com/office/drawing/2010/main" xmlns="">
                 <a:solidFill>
                   <a:srgbClr val="FFFFFF"/>
                 </a:solidFill>
@@ -9576,7 +9577,7 @@
               </a:ln>
               <a:extLst>
                 <a:ext uri="{91240B29-F687-4f45-9708-019B960494DF}">
-                  <a14:hiddenLine xmlns="" xmlns:a14="http://schemas.microsoft.com/office/drawing/2010/main" w="9525">
+                  <a14:hiddenLine xmlns:a14="http://schemas.microsoft.com/office/drawing/2010/main" xmlns="" w="9525">
                     <a:solidFill>
                       <a:srgbClr val="000000"/>
                     </a:solidFill>
@@ -9666,7 +9667,7 @@
               </a:ln>
               <a:extLst>
                 <a:ext uri="{91240B29-F687-4f45-9708-019B960494DF}">
-                  <a14:hiddenLine xmlns="" xmlns:a14="http://schemas.microsoft.com/office/drawing/2010/main" w="9525">
+                  <a14:hiddenLine xmlns:a14="http://schemas.microsoft.com/office/drawing/2010/main" xmlns="" w="9525">
                     <a:solidFill>
                       <a:srgbClr val="000000"/>
                     </a:solidFill>
@@ -9756,7 +9757,7 @@
               </a:ln>
               <a:extLst>
                 <a:ext uri="{91240B29-F687-4f45-9708-019B960494DF}">
-                  <a14:hiddenLine xmlns="" xmlns:a14="http://schemas.microsoft.com/office/drawing/2010/main" w="9525">
+                  <a14:hiddenLine xmlns:a14="http://schemas.microsoft.com/office/drawing/2010/main" xmlns="" w="9525">
                     <a:solidFill>
                       <a:srgbClr val="000000"/>
                     </a:solidFill>
@@ -9818,7 +9819,7 @@
               </a:ln>
               <a:extLst>
                 <a:ext uri="{91240B29-F687-4f45-9708-019B960494DF}">
-                  <a14:hiddenLine xmlns="" xmlns:a14="http://schemas.microsoft.com/office/drawing/2010/main" w="9525">
+                  <a14:hiddenLine xmlns:a14="http://schemas.microsoft.com/office/drawing/2010/main" xmlns="" w="9525">
                     <a:solidFill>
                       <a:srgbClr val="000000"/>
                     </a:solidFill>
@@ -9908,7 +9909,7 @@
               </a:ln>
               <a:extLst>
                 <a:ext uri="{91240B29-F687-4f45-9708-019B960494DF}">
-                  <a14:hiddenLine xmlns="" xmlns:a14="http://schemas.microsoft.com/office/drawing/2010/main" w="9525">
+                  <a14:hiddenLine xmlns:a14="http://schemas.microsoft.com/office/drawing/2010/main" xmlns="" w="9525">
                     <a:solidFill>
                       <a:srgbClr val="000000"/>
                     </a:solidFill>
@@ -9970,7 +9971,7 @@
               </a:ln>
               <a:extLst>
                 <a:ext uri="{91240B29-F687-4f45-9708-019B960494DF}">
-                  <a14:hiddenLine xmlns="" xmlns:a14="http://schemas.microsoft.com/office/drawing/2010/main" w="9525">
+                  <a14:hiddenLine xmlns:a14="http://schemas.microsoft.com/office/drawing/2010/main" xmlns="" w="9525">
                     <a:solidFill>
                       <a:srgbClr val="000000"/>
                     </a:solidFill>
@@ -10032,7 +10033,7 @@
               </a:ln>
               <a:extLst>
                 <a:ext uri="{91240B29-F687-4f45-9708-019B960494DF}">
-                  <a14:hiddenLine xmlns="" xmlns:a14="http://schemas.microsoft.com/office/drawing/2010/main" w="9525">
+                  <a14:hiddenLine xmlns:a14="http://schemas.microsoft.com/office/drawing/2010/main" xmlns="" w="9525">
                     <a:solidFill>
                       <a:srgbClr val="000000"/>
                     </a:solidFill>
@@ -10122,7 +10123,7 @@
               </a:ln>
               <a:extLst>
                 <a:ext uri="{91240B29-F687-4f45-9708-019B960494DF}">
-                  <a14:hiddenLine xmlns="" xmlns:a14="http://schemas.microsoft.com/office/drawing/2010/main" w="9525">
+                  <a14:hiddenLine xmlns:a14="http://schemas.microsoft.com/office/drawing/2010/main" xmlns="" w="9525">
                     <a:solidFill>
                       <a:srgbClr val="000000"/>
                     </a:solidFill>
@@ -10212,7 +10213,7 @@
               </a:ln>
               <a:extLst>
                 <a:ext uri="{91240B29-F687-4f45-9708-019B960494DF}">
-                  <a14:hiddenLine xmlns="" xmlns:a14="http://schemas.microsoft.com/office/drawing/2010/main" w="9525">
+                  <a14:hiddenLine xmlns:a14="http://schemas.microsoft.com/office/drawing/2010/main" xmlns="" w="9525">
                     <a:solidFill>
                       <a:srgbClr val="000000"/>
                     </a:solidFill>
@@ -10274,7 +10275,7 @@
               </a:ln>
               <a:extLst>
                 <a:ext uri="{91240B29-F687-4f45-9708-019B960494DF}">
-                  <a14:hiddenLine xmlns="" xmlns:a14="http://schemas.microsoft.com/office/drawing/2010/main" w="9525">
+                  <a14:hiddenLine xmlns:a14="http://schemas.microsoft.com/office/drawing/2010/main" xmlns="" w="9525">
                     <a:solidFill>
                       <a:srgbClr val="000000"/>
                     </a:solidFill>
@@ -10384,7 +10385,7 @@
               </a:ln>
               <a:extLst>
                 <a:ext uri="{91240B29-F687-4f45-9708-019B960494DF}">
-                  <a14:hiddenLine xmlns="" xmlns:a14="http://schemas.microsoft.com/office/drawing/2010/main" w="9525">
+                  <a14:hiddenLine xmlns:a14="http://schemas.microsoft.com/office/drawing/2010/main" xmlns="" w="9525">
                     <a:solidFill>
                       <a:srgbClr val="000000"/>
                     </a:solidFill>
@@ -10468,7 +10469,7 @@
               </a:ln>
               <a:extLst>
                 <a:ext uri="{91240B29-F687-4f45-9708-019B960494DF}">
-                  <a14:hiddenLine xmlns="" xmlns:a14="http://schemas.microsoft.com/office/drawing/2010/main" w="9525">
+                  <a14:hiddenLine xmlns:a14="http://schemas.microsoft.com/office/drawing/2010/main" xmlns="" w="9525">
                     <a:solidFill>
                       <a:srgbClr val="000000"/>
                     </a:solidFill>
@@ -10530,7 +10531,7 @@
               </a:ln>
               <a:extLst>
                 <a:ext uri="{91240B29-F687-4f45-9708-019B960494DF}">
-                  <a14:hiddenLine xmlns="" xmlns:a14="http://schemas.microsoft.com/office/drawing/2010/main" w="9525">
+                  <a14:hiddenLine xmlns:a14="http://schemas.microsoft.com/office/drawing/2010/main" xmlns="" w="9525">
                     <a:solidFill>
                       <a:srgbClr val="000000"/>
                     </a:solidFill>
@@ -10592,7 +10593,7 @@
               </a:ln>
               <a:extLst>
                 <a:ext uri="{91240B29-F687-4f45-9708-019B960494DF}">
-                  <a14:hiddenLine xmlns="" xmlns:a14="http://schemas.microsoft.com/office/drawing/2010/main" w="9525">
+                  <a14:hiddenLine xmlns:a14="http://schemas.microsoft.com/office/drawing/2010/main" xmlns="" w="9525">
                     <a:solidFill>
                       <a:srgbClr val="000000"/>
                     </a:solidFill>
@@ -10682,7 +10683,7 @@
               </a:ln>
               <a:extLst>
                 <a:ext uri="{91240B29-F687-4f45-9708-019B960494DF}">
-                  <a14:hiddenLine xmlns="" xmlns:a14="http://schemas.microsoft.com/office/drawing/2010/main" w="9525">
+                  <a14:hiddenLine xmlns:a14="http://schemas.microsoft.com/office/drawing/2010/main" xmlns="" w="9525">
                     <a:solidFill>
                       <a:srgbClr val="000000"/>
                     </a:solidFill>
@@ -10716,7 +10717,7 @@
               </a:ln>
               <a:extLst>
                 <a:ext uri="{91240B29-F687-4f45-9708-019B960494DF}">
-                  <a14:hiddenLine xmlns="" xmlns:a14="http://schemas.microsoft.com/office/drawing/2010/main" w="9525">
+                  <a14:hiddenLine xmlns:a14="http://schemas.microsoft.com/office/drawing/2010/main" xmlns="" w="9525">
                     <a:solidFill>
                       <a:srgbClr val="000000"/>
                     </a:solidFill>
@@ -10781,7 +10782,7 @@
               </a:ln>
               <a:extLst>
                 <a:ext uri="{91240B29-F687-4f45-9708-019B960494DF}">
-                  <a14:hiddenLine xmlns="" xmlns:a14="http://schemas.microsoft.com/office/drawing/2010/main" w="9525">
+                  <a14:hiddenLine xmlns:a14="http://schemas.microsoft.com/office/drawing/2010/main" xmlns="" w="9525">
                     <a:solidFill>
                       <a:srgbClr val="000000"/>
                     </a:solidFill>
@@ -10871,7 +10872,7 @@
               </a:ln>
               <a:extLst>
                 <a:ext uri="{91240B29-F687-4f45-9708-019B960494DF}">
-                  <a14:hiddenLine xmlns="" xmlns:a14="http://schemas.microsoft.com/office/drawing/2010/main" w="9525">
+                  <a14:hiddenLine xmlns:a14="http://schemas.microsoft.com/office/drawing/2010/main" xmlns="" w="9525">
                     <a:solidFill>
                       <a:srgbClr val="000000"/>
                     </a:solidFill>
@@ -10933,7 +10934,7 @@
               </a:ln>
               <a:extLst>
                 <a:ext uri="{91240B29-F687-4f45-9708-019B960494DF}">
-                  <a14:hiddenLine xmlns="" xmlns:a14="http://schemas.microsoft.com/office/drawing/2010/main" w="9525">
+                  <a14:hiddenLine xmlns:a14="http://schemas.microsoft.com/office/drawing/2010/main" xmlns="" w="9525">
                     <a:solidFill>
                       <a:srgbClr val="000000"/>
                     </a:solidFill>
@@ -11023,7 +11024,7 @@
               </a:ln>
               <a:extLst>
                 <a:ext uri="{91240B29-F687-4f45-9708-019B960494DF}">
-                  <a14:hiddenLine xmlns="" xmlns:a14="http://schemas.microsoft.com/office/drawing/2010/main" w="9525">
+                  <a14:hiddenLine xmlns:a14="http://schemas.microsoft.com/office/drawing/2010/main" xmlns="" w="9525">
                     <a:solidFill>
                       <a:srgbClr val="000000"/>
                     </a:solidFill>
@@ -11088,7 +11089,7 @@
               </a:ln>
               <a:extLst>
                 <a:ext uri="{91240B29-F687-4f45-9708-019B960494DF}">
-                  <a14:hiddenLine xmlns="" xmlns:a14="http://schemas.microsoft.com/office/drawing/2010/main" w="9525">
+                  <a14:hiddenLine xmlns:a14="http://schemas.microsoft.com/office/drawing/2010/main" xmlns="" w="9525">
                     <a:solidFill>
                       <a:srgbClr val="000000"/>
                     </a:solidFill>
@@ -11150,7 +11151,7 @@
               </a:ln>
               <a:extLst>
                 <a:ext uri="{91240B29-F687-4f45-9708-019B960494DF}">
-                  <a14:hiddenLine xmlns="" xmlns:a14="http://schemas.microsoft.com/office/drawing/2010/main" w="9525">
+                  <a14:hiddenLine xmlns:a14="http://schemas.microsoft.com/office/drawing/2010/main" xmlns="" w="9525">
                     <a:solidFill>
                       <a:srgbClr val="000000"/>
                     </a:solidFill>
@@ -11240,7 +11241,7 @@
               </a:ln>
               <a:extLst>
                 <a:ext uri="{91240B29-F687-4f45-9708-019B960494DF}">
-                  <a14:hiddenLine xmlns="" xmlns:a14="http://schemas.microsoft.com/office/drawing/2010/main" w="9525">
+                  <a14:hiddenLine xmlns:a14="http://schemas.microsoft.com/office/drawing/2010/main" xmlns="" w="9525">
                     <a:solidFill>
                       <a:srgbClr val="000000"/>
                     </a:solidFill>
@@ -11330,7 +11331,7 @@
               </a:ln>
               <a:extLst>
                 <a:ext uri="{91240B29-F687-4f45-9708-019B960494DF}">
-                  <a14:hiddenLine xmlns="" xmlns:a14="http://schemas.microsoft.com/office/drawing/2010/main" w="9525">
+                  <a14:hiddenLine xmlns:a14="http://schemas.microsoft.com/office/drawing/2010/main" xmlns="" w="9525">
                     <a:solidFill>
                       <a:srgbClr val="000000"/>
                     </a:solidFill>
@@ -11395,7 +11396,7 @@
               </a:ln>
               <a:extLst>
                 <a:ext uri="{91240B29-F687-4f45-9708-019B960494DF}">
-                  <a14:hiddenLine xmlns="" xmlns:a14="http://schemas.microsoft.com/office/drawing/2010/main" w="9525">
+                  <a14:hiddenLine xmlns:a14="http://schemas.microsoft.com/office/drawing/2010/main" xmlns="" w="9525">
                     <a:solidFill>
                       <a:srgbClr val="000000"/>
                     </a:solidFill>
@@ -11515,7 +11516,7 @@
               </a:ln>
               <a:extLst>
                 <a:ext uri="{91240B29-F687-4f45-9708-019B960494DF}">
-                  <a14:hiddenLine xmlns="" xmlns:a14="http://schemas.microsoft.com/office/drawing/2010/main" w="9525">
+                  <a14:hiddenLine xmlns:a14="http://schemas.microsoft.com/office/drawing/2010/main" xmlns="" w="9525">
                     <a:solidFill>
                       <a:srgbClr val="000000"/>
                     </a:solidFill>
@@ -11613,7 +11614,7 @@
               </a:ln>
               <a:extLst>
                 <a:ext uri="{91240B29-F687-4f45-9708-019B960494DF}">
-                  <a14:hiddenLine xmlns="" xmlns:a14="http://schemas.microsoft.com/office/drawing/2010/main" w="9525">
+                  <a14:hiddenLine xmlns:a14="http://schemas.microsoft.com/office/drawing/2010/main" xmlns="" w="9525">
                     <a:solidFill>
                       <a:srgbClr val="000000"/>
                     </a:solidFill>
@@ -11728,7 +11729,7 @@
               </a:ln>
               <a:extLst>
                 <a:ext uri="{91240B29-F687-4f45-9708-019B960494DF}">
-                  <a14:hiddenLine xmlns="" xmlns:a14="http://schemas.microsoft.com/office/drawing/2010/main" w="9525">
+                  <a14:hiddenLine xmlns:a14="http://schemas.microsoft.com/office/drawing/2010/main" xmlns="" w="9525">
                     <a:solidFill>
                       <a:srgbClr val="000000"/>
                     </a:solidFill>
@@ -11818,7 +11819,7 @@
               </a:ln>
               <a:extLst>
                 <a:ext uri="{91240B29-F687-4f45-9708-019B960494DF}">
-                  <a14:hiddenLine xmlns="" xmlns:a14="http://schemas.microsoft.com/office/drawing/2010/main" w="9525">
+                  <a14:hiddenLine xmlns:a14="http://schemas.microsoft.com/office/drawing/2010/main" xmlns="" w="9525">
                     <a:solidFill>
                       <a:srgbClr val="000000"/>
                     </a:solidFill>
@@ -11883,7 +11884,7 @@
               </a:ln>
               <a:extLst>
                 <a:ext uri="{91240B29-F687-4f45-9708-019B960494DF}">
-                  <a14:hiddenLine xmlns="" xmlns:a14="http://schemas.microsoft.com/office/drawing/2010/main" w="9525">
+                  <a14:hiddenLine xmlns:a14="http://schemas.microsoft.com/office/drawing/2010/main" xmlns="" w="9525">
                     <a:solidFill>
                       <a:srgbClr val="000000"/>
                     </a:solidFill>
@@ -11973,7 +11974,7 @@
               </a:ln>
               <a:extLst>
                 <a:ext uri="{91240B29-F687-4f45-9708-019B960494DF}">
-                  <a14:hiddenLine xmlns="" xmlns:a14="http://schemas.microsoft.com/office/drawing/2010/main" w="9525">
+                  <a14:hiddenLine xmlns:a14="http://schemas.microsoft.com/office/drawing/2010/main" xmlns="" w="9525">
                     <a:solidFill>
                       <a:srgbClr val="000000"/>
                     </a:solidFill>
@@ -12041,7 +12042,7 @@
               </a:ln>
               <a:extLst>
                 <a:ext uri="{91240B29-F687-4f45-9708-019B960494DF}">
-                  <a14:hiddenLine xmlns="" xmlns:a14="http://schemas.microsoft.com/office/drawing/2010/main" w="9525">
+                  <a14:hiddenLine xmlns:a14="http://schemas.microsoft.com/office/drawing/2010/main" xmlns="" w="9525">
                     <a:solidFill>
                       <a:srgbClr val="000000"/>
                     </a:solidFill>
@@ -12131,7 +12132,7 @@
               </a:ln>
               <a:extLst>
                 <a:ext uri="{91240B29-F687-4f45-9708-019B960494DF}">
-                  <a14:hiddenLine xmlns="" xmlns:a14="http://schemas.microsoft.com/office/drawing/2010/main" w="9525">
+                  <a14:hiddenLine xmlns:a14="http://schemas.microsoft.com/office/drawing/2010/main" xmlns="" w="9525">
                     <a:solidFill>
                       <a:srgbClr val="000000"/>
                     </a:solidFill>
@@ -12199,7 +12200,7 @@
               </a:ln>
               <a:extLst>
                 <a:ext uri="{91240B29-F687-4f45-9708-019B960494DF}">
-                  <a14:hiddenLine xmlns="" xmlns:a14="http://schemas.microsoft.com/office/drawing/2010/main" w="9525">
+                  <a14:hiddenLine xmlns:a14="http://schemas.microsoft.com/office/drawing/2010/main" xmlns="" w="9525">
                     <a:solidFill>
                       <a:srgbClr val="000000"/>
                     </a:solidFill>
@@ -12289,7 +12290,7 @@
               </a:ln>
               <a:extLst>
                 <a:ext uri="{91240B29-F687-4f45-9708-019B960494DF}">
-                  <a14:hiddenLine xmlns="" xmlns:a14="http://schemas.microsoft.com/office/drawing/2010/main" w="9525">
+                  <a14:hiddenLine xmlns:a14="http://schemas.microsoft.com/office/drawing/2010/main" xmlns="" w="9525">
                     <a:solidFill>
                       <a:srgbClr val="000000"/>
                     </a:solidFill>
@@ -12323,7 +12324,7 @@
               </a:ln>
               <a:extLst>
                 <a:ext uri="{91240B29-F687-4f45-9708-019B960494DF}">
-                  <a14:hiddenLine xmlns="" xmlns:a14="http://schemas.microsoft.com/office/drawing/2010/main" w="9525">
+                  <a14:hiddenLine xmlns:a14="http://schemas.microsoft.com/office/drawing/2010/main" xmlns="" w="9525">
                     <a:solidFill>
                       <a:srgbClr val="000000"/>
                     </a:solidFill>
@@ -12463,7 +12464,7 @@
           <a:p>
             <a:fld id="{FDA64800-81E6-4B3F-A854-A27E596CDA46}" type="datetimeFigureOut">
               <a:rPr lang="en-GB" smtClean="0"/>
-              <a:t>21/01/2025</a:t>
+              <a:t>22/01/2025</a:t>
             </a:fld>
             <a:endParaRPr lang="en-GB"/>
           </a:p>
@@ -13082,6 +13083,261 @@
           <p:cNvPr id="2" name="Titlu 1">
             <a:extLst>
               <a:ext uri="{FF2B5EF4-FFF2-40B4-BE49-F238E27FC236}">
+                <a16:creationId xmlns:a16="http://schemas.microsoft.com/office/drawing/2014/main" id="{C0DAF716-5CBC-9C30-C4B2-B4D39163B5DD}"/>
+              </a:ext>
+            </a:extLst>
+          </p:cNvPr>
+          <p:cNvSpPr>
+            <a:spLocks noGrp="1"/>
+          </p:cNvSpPr>
+          <p:nvPr>
+            <p:ph type="title"/>
+          </p:nvPr>
+        </p:nvSpPr>
+        <p:spPr/>
+        <p:txBody>
+          <a:bodyPr/>
+          <a:lstStyle/>
+          <a:p>
+            <a:r>
+              <a:rPr lang="en-US" dirty="0"/>
+              <a:t>Debug mode</a:t>
+            </a:r>
+            <a:endParaRPr lang="en-GB" dirty="0"/>
+          </a:p>
+        </p:txBody>
+      </p:sp>
+      <p:sp>
+        <p:nvSpPr>
+          <p:cNvPr id="3" name="Substituent conținut 2">
+            <a:extLst>
+              <a:ext uri="{FF2B5EF4-FFF2-40B4-BE49-F238E27FC236}">
+                <a16:creationId xmlns:a16="http://schemas.microsoft.com/office/drawing/2014/main" id="{B37F4570-C8C1-494E-9633-B461747DC126}"/>
+              </a:ext>
+            </a:extLst>
+          </p:cNvPr>
+          <p:cNvSpPr>
+            <a:spLocks noGrp="1"/>
+          </p:cNvSpPr>
+          <p:nvPr>
+            <p:ph idx="1"/>
+          </p:nvPr>
+        </p:nvSpPr>
+        <p:spPr>
+          <a:xfrm>
+            <a:off x="1141413" y="2249487"/>
+            <a:ext cx="4336362" cy="3541714"/>
+          </a:xfrm>
+        </p:spPr>
+        <p:txBody>
+          <a:bodyPr/>
+          <a:lstStyle/>
+          <a:p>
+            <a:r>
+              <a:rPr lang="en-US" dirty="0"/>
+              <a:t>In </a:t>
+            </a:r>
+            <a:r>
+              <a:rPr lang="en-US" dirty="0" err="1"/>
+              <a:t>func</a:t>
+            </a:r>
+            <a:r>
+              <a:rPr lang="ro-RO" dirty="0" err="1"/>
+              <a:t>ţ</a:t>
+            </a:r>
+            <a:r>
+              <a:rPr lang="en-US" dirty="0" err="1"/>
+              <a:t>ia</a:t>
+            </a:r>
+            <a:r>
+              <a:rPr lang="en-US" dirty="0"/>
+              <a:t> </a:t>
+            </a:r>
+            <a:r>
+              <a:rPr lang="en-US" i="1" dirty="0" err="1"/>
+              <a:t>image_callback</a:t>
+            </a:r>
+            <a:r>
+              <a:rPr lang="en-US" i="1" dirty="0"/>
+              <a:t> </a:t>
+            </a:r>
+            <a:r>
+              <a:rPr lang="en-US" dirty="0" err="1"/>
+              <a:t>afi</a:t>
+            </a:r>
+            <a:r>
+              <a:rPr lang="ro-RO" dirty="0" err="1"/>
+              <a:t>şă</a:t>
+            </a:r>
+            <a:r>
+              <a:rPr lang="en-US" dirty="0"/>
+              <a:t>m </a:t>
+            </a:r>
+            <a:r>
+              <a:rPr lang="en-US" dirty="0" err="1"/>
+              <a:t>imaginea</a:t>
+            </a:r>
+            <a:r>
+              <a:rPr lang="en-US" dirty="0"/>
+              <a:t> </a:t>
+            </a:r>
+            <a:r>
+              <a:rPr lang="en-US" dirty="0" err="1"/>
+              <a:t>primit</a:t>
+            </a:r>
+            <a:r>
+              <a:rPr lang="ro-RO" dirty="0"/>
+              <a:t>ă</a:t>
+            </a:r>
+            <a:r>
+              <a:rPr lang="en-US" dirty="0"/>
+              <a:t> de la robot </a:t>
+            </a:r>
+            <a:r>
+              <a:rPr lang="en-US" dirty="0" err="1"/>
+              <a:t>pentru</a:t>
+            </a:r>
+            <a:r>
+              <a:rPr lang="en-US" dirty="0"/>
+              <a:t> a </a:t>
+            </a:r>
+            <a:r>
+              <a:rPr lang="en-US" dirty="0" err="1"/>
+              <a:t>putea</a:t>
+            </a:r>
+            <a:r>
+              <a:rPr lang="en-US" dirty="0"/>
+              <a:t> in</a:t>
+            </a:r>
+            <a:r>
+              <a:rPr lang="ro-RO" dirty="0" err="1"/>
+              <a:t>ţ</a:t>
+            </a:r>
+            <a:r>
+              <a:rPr lang="en-US" dirty="0" err="1"/>
+              <a:t>elege</a:t>
+            </a:r>
+            <a:r>
+              <a:rPr lang="en-US" dirty="0"/>
+              <a:t> cu u</a:t>
+            </a:r>
+            <a:r>
+              <a:rPr lang="ro-RO" dirty="0" err="1"/>
+              <a:t>ş</a:t>
+            </a:r>
+            <a:r>
+              <a:rPr lang="en-US" dirty="0" err="1"/>
+              <a:t>urinta</a:t>
+            </a:r>
+            <a:r>
+              <a:rPr lang="en-US" dirty="0"/>
+              <a:t> </a:t>
+            </a:r>
+            <a:r>
+              <a:rPr lang="en-US" dirty="0" err="1"/>
+              <a:t>ce</a:t>
+            </a:r>
+            <a:r>
+              <a:rPr lang="en-US" dirty="0"/>
+              <a:t> se </a:t>
+            </a:r>
+            <a:r>
+              <a:rPr lang="ro-RO" dirty="0"/>
+              <a:t>î</a:t>
+            </a:r>
+            <a:r>
+              <a:rPr lang="en-US" dirty="0" err="1"/>
+              <a:t>nt</a:t>
+            </a:r>
+            <a:r>
+              <a:rPr lang="ro-RO" dirty="0"/>
+              <a:t>â</a:t>
+            </a:r>
+            <a:r>
+              <a:rPr lang="en-US" dirty="0" err="1"/>
+              <a:t>mpl</a:t>
+            </a:r>
+            <a:r>
+              <a:rPr lang="ro-RO" dirty="0"/>
+              <a:t>ă</a:t>
+            </a:r>
+            <a:r>
+              <a:rPr lang="en-US" i="1" dirty="0"/>
+              <a:t> </a:t>
+            </a:r>
+            <a:r>
+              <a:rPr lang="en-US" dirty="0"/>
+              <a:t> </a:t>
+            </a:r>
+            <a:endParaRPr lang="en-GB" dirty="0"/>
+          </a:p>
+        </p:txBody>
+      </p:sp>
+      <p:pic>
+        <p:nvPicPr>
+          <p:cNvPr id="7" name="Imagine 6">
+            <a:extLst>
+              <a:ext uri="{FF2B5EF4-FFF2-40B4-BE49-F238E27FC236}">
+                <a16:creationId xmlns:a16="http://schemas.microsoft.com/office/drawing/2014/main" id="{2EDACAF1-ADBA-04D9-454E-6AAB3E43FC61}"/>
+              </a:ext>
+            </a:extLst>
+          </p:cNvPr>
+          <p:cNvPicPr>
+            <a:picLocks noChangeAspect="1"/>
+          </p:cNvPicPr>
+          <p:nvPr/>
+        </p:nvPicPr>
+        <p:blipFill>
+          <a:blip r:embed="rId2"/>
+          <a:stretch>
+            <a:fillRect/>
+          </a:stretch>
+        </p:blipFill>
+        <p:spPr>
+          <a:xfrm>
+            <a:off x="7784832" y="2166761"/>
+            <a:ext cx="3419952" cy="2524477"/>
+          </a:xfrm>
+          <a:prstGeom prst="rect">
+            <a:avLst/>
+          </a:prstGeom>
+        </p:spPr>
+      </p:pic>
+    </p:spTree>
+    <p:extLst>
+      <p:ext uri="{BB962C8B-B14F-4D97-AF65-F5344CB8AC3E}">
+        <p14:creationId xmlns:p14="http://schemas.microsoft.com/office/powerpoint/2010/main" val="1910569310"/>
+      </p:ext>
+    </p:extLst>
+  </p:cSld>
+  <p:clrMapOvr>
+    <a:masterClrMapping/>
+  </p:clrMapOvr>
+</p:sld>
+</file>
+
+<file path=ppt/slides/slide11.xml><?xml version="1.0" encoding="utf-8"?>
+<p:sld xmlns:a="http://schemas.openxmlformats.org/drawingml/2006/main" xmlns:r="http://schemas.openxmlformats.org/officeDocument/2006/relationships" xmlns:p="http://schemas.openxmlformats.org/presentationml/2006/main">
+  <p:cSld>
+    <p:spTree>
+      <p:nvGrpSpPr>
+        <p:cNvPr id="1" name=""/>
+        <p:cNvGrpSpPr/>
+        <p:nvPr/>
+      </p:nvGrpSpPr>
+      <p:grpSpPr>
+        <a:xfrm>
+          <a:off x="0" y="0"/>
+          <a:ext cx="0" cy="0"/>
+          <a:chOff x="0" y="0"/>
+          <a:chExt cx="0" cy="0"/>
+        </a:xfrm>
+      </p:grpSpPr>
+      <p:sp>
+        <p:nvSpPr>
+          <p:cNvPr id="2" name="Titlu 1">
+            <a:extLst>
+              <a:ext uri="{FF2B5EF4-FFF2-40B4-BE49-F238E27FC236}">
                 <a16:creationId xmlns:a16="http://schemas.microsoft.com/office/drawing/2014/main" id="{28A40CB1-0503-526C-0721-7AA7C4C98FBC}"/>
               </a:ext>
             </a:extLst>
@@ -13502,7 +13758,7 @@
 </p:sld>
 </file>
 
-<file path=ppt/slides/slide11.xml><?xml version="1.0" encoding="utf-8"?>
+<file path=ppt/slides/slide12.xml><?xml version="1.0" encoding="utf-8"?>
 <p:sld xmlns:a="http://schemas.openxmlformats.org/drawingml/2006/main" xmlns:r="http://schemas.openxmlformats.org/officeDocument/2006/relationships" xmlns:p="http://schemas.openxmlformats.org/presentationml/2006/main">
   <p:cSld>
     <p:spTree>
@@ -14894,7 +15150,9 @@
         </p:nvSpPr>
         <p:spPr/>
         <p:txBody>
-          <a:bodyPr/>
+          <a:bodyPr>
+            <a:normAutofit fontScale="92500" lnSpcReduction="10000"/>
+          </a:bodyPr>
           <a:lstStyle/>
           <a:p>
             <a:r>
@@ -14958,6 +15216,27 @@
             <a:r>
               <a:rPr lang="en-GB" dirty="0"/>
               <a:t>ă</a:t>
+            </a:r>
+          </a:p>
+          <a:p>
+            <a:endParaRPr lang="en-GB" dirty="0"/>
+          </a:p>
+          <a:p>
+            <a:r>
+              <a:rPr lang="en-GB" dirty="0" err="1"/>
+              <a:t>Detectare</a:t>
+            </a:r>
+            <a:r>
+              <a:rPr lang="en-GB" dirty="0"/>
+              <a:t> </a:t>
+            </a:r>
+            <a:r>
+              <a:rPr lang="en-GB" dirty="0" err="1"/>
+              <a:t>semn</a:t>
+            </a:r>
+            <a:r>
+              <a:rPr lang="en-GB" dirty="0"/>
+              <a:t> de stop </a:t>
             </a:r>
           </a:p>
           <a:p>
@@ -16224,10 +16503,10 @@
       </p:grpSpPr>
       <p:sp>
         <p:nvSpPr>
-          <p:cNvPr id="2" name="Titlu 1">
+          <p:cNvPr id="2" name="Title 1">
             <a:extLst>
               <a:ext uri="{FF2B5EF4-FFF2-40B4-BE49-F238E27FC236}">
-                <a16:creationId xmlns:a16="http://schemas.microsoft.com/office/drawing/2014/main" id="{C0DAF716-5CBC-9C30-C4B2-B4D39163B5DD}"/>
+                <a16:creationId xmlns:a16="http://schemas.microsoft.com/office/drawing/2014/main" id="{CF73F5EA-9C62-A7BD-79DB-23EF25DD746C}"/>
               </a:ext>
             </a:extLst>
           </p:cNvPr>
@@ -16245,18 +16524,53 @@
           <a:p>
             <a:r>
               <a:rPr lang="en-US" dirty="0"/>
-              <a:t>Debug mode</a:t>
-            </a:r>
-            <a:endParaRPr lang="en-GB" dirty="0"/>
+              <a:t>Cum </a:t>
+            </a:r>
+            <a:r>
+              <a:rPr lang="en-US" dirty="0" err="1"/>
+              <a:t>func</a:t>
+            </a:r>
+            <a:r>
+              <a:rPr lang="ro-RO" dirty="0"/>
+              <a:t>ţ</a:t>
+            </a:r>
+            <a:r>
+              <a:rPr lang="en-US" dirty="0" err="1"/>
+              <a:t>ioneaz</a:t>
+            </a:r>
+            <a:r>
+              <a:rPr lang="ro-RO" dirty="0"/>
+              <a:t>ă</a:t>
+            </a:r>
+            <a:r>
+              <a:rPr lang="en-US" dirty="0"/>
+              <a:t> </a:t>
+            </a:r>
+            <a:r>
+              <a:rPr lang="en-US" dirty="0" err="1"/>
+              <a:t>Detectarea</a:t>
+            </a:r>
+            <a:r>
+              <a:rPr lang="en-US" dirty="0"/>
+              <a:t> </a:t>
+            </a:r>
+            <a:r>
+              <a:rPr lang="en-US" dirty="0" err="1"/>
+              <a:t>semnului</a:t>
+            </a:r>
+            <a:r>
+              <a:rPr lang="en-US" dirty="0"/>
+              <a:t> stop</a:t>
+            </a:r>
           </a:p>
         </p:txBody>
       </p:sp>
       <p:sp>
         <p:nvSpPr>
-          <p:cNvPr id="3" name="Substituent conținut 2">
+          <p:cNvPr id="3" name="Content Placeholder 2">
             <a:extLst>
               <a:ext uri="{FF2B5EF4-FFF2-40B4-BE49-F238E27FC236}">
-                <a16:creationId xmlns:a16="http://schemas.microsoft.com/office/drawing/2014/main" id="{B37F4570-C8C1-494E-9633-B461747DC126}"/>
+                <a16:creationId xmlns:a16="http://schemas.microsoft.com/office/drawing/2014/main" id="{2054B9E2-1EFA-70E3-129C-7FC6D162B7F4}"/>
               </a:ext>
             </a:extLst>
           </p:cNvPr>
@@ -16267,26 +16581,266 @@
             <p:ph idx="1"/>
           </p:nvPr>
         </p:nvSpPr>
-        <p:spPr>
-          <a:xfrm>
-            <a:off x="1141413" y="2249487"/>
-            <a:ext cx="4336362" cy="3541714"/>
-          </a:xfrm>
-        </p:spPr>
+        <p:spPr/>
         <p:txBody>
-          <a:bodyPr/>
+          <a:bodyPr>
+            <a:normAutofit fontScale="92500"/>
+          </a:bodyPr>
           <a:lstStyle/>
           <a:p>
             <a:r>
-              <a:rPr lang="en-US" dirty="0"/>
-              <a:t>In </a:t>
+              <a:rPr lang="en-US" dirty="0" err="1"/>
+              <a:t>Func</a:t>
+            </a:r>
+            <a:r>
+              <a:rPr lang="ro-RO" dirty="0"/>
+              <a:t>ţ</a:t>
+            </a:r>
+            <a:r>
+              <a:rPr lang="en-US" dirty="0" err="1"/>
+              <a:t>ia</a:t>
+            </a:r>
+            <a:r>
+              <a:rPr lang="en-US" i="1" dirty="0"/>
+              <a:t> </a:t>
+            </a:r>
+            <a:r>
+              <a:rPr lang="en-US" i="1" dirty="0" err="1"/>
+              <a:t>detect_red_line</a:t>
+            </a:r>
+            <a:r>
+              <a:rPr lang="en-US" dirty="0"/>
+              <a:t> </a:t>
+            </a:r>
+            <a:r>
+              <a:rPr lang="en-US" dirty="0" err="1"/>
+              <a:t>este</a:t>
+            </a:r>
+            <a:r>
+              <a:rPr lang="en-US" dirty="0"/>
+              <a:t> </a:t>
+            </a:r>
+            <a:r>
+              <a:rPr lang="en-US" dirty="0" err="1"/>
+              <a:t>folosit</a:t>
+            </a:r>
+            <a:r>
+              <a:rPr lang="ro-RO" dirty="0"/>
+              <a:t>ă</a:t>
+            </a:r>
+            <a:r>
+              <a:rPr lang="en-US" dirty="0"/>
+              <a:t> </a:t>
+            </a:r>
+            <a:r>
+              <a:rPr lang="en-US" dirty="0" err="1"/>
+              <a:t>pentru</a:t>
+            </a:r>
+            <a:r>
+              <a:rPr lang="en-US" dirty="0"/>
+              <a:t> a </a:t>
+            </a:r>
+            <a:r>
+              <a:rPr lang="en-US" dirty="0" err="1"/>
+              <a:t>decta</a:t>
+            </a:r>
+            <a:r>
+              <a:rPr lang="en-US" dirty="0"/>
+              <a:t> in </a:t>
+            </a:r>
+            <a:r>
+              <a:rPr lang="en-US" dirty="0" err="1"/>
+              <a:t>partea</a:t>
+            </a:r>
+            <a:r>
+              <a:rPr lang="en-US" dirty="0"/>
+              <a:t> de </a:t>
+            </a:r>
+            <a:r>
+              <a:rPr lang="en-US" dirty="0" err="1"/>
+              <a:t>jos</a:t>
+            </a:r>
+            <a:r>
+              <a:rPr lang="en-US" dirty="0"/>
+              <a:t> a </a:t>
+            </a:r>
+            <a:r>
+              <a:rPr lang="en-US" dirty="0" err="1"/>
+              <a:t>imaginii</a:t>
+            </a:r>
+            <a:r>
+              <a:rPr lang="en-US" dirty="0"/>
+              <a:t> o </a:t>
+            </a:r>
+            <a:r>
+              <a:rPr lang="en-US" dirty="0" err="1"/>
+              <a:t>linie</a:t>
+            </a:r>
+            <a:r>
+              <a:rPr lang="en-US" dirty="0"/>
+              <a:t> </a:t>
+            </a:r>
+            <a:r>
+              <a:rPr lang="en-US" dirty="0" err="1"/>
+              <a:t>ro</a:t>
+            </a:r>
+            <a:r>
+              <a:rPr lang="ro-RO" dirty="0"/>
+              <a:t>ş</a:t>
+            </a:r>
+            <a:r>
+              <a:rPr lang="en-US" dirty="0" err="1"/>
+              <a:t>ie</a:t>
+            </a:r>
+            <a:r>
+              <a:rPr lang="en-US" dirty="0"/>
+              <a:t> in </a:t>
+            </a:r>
+            <a:r>
+              <a:rPr lang="en-US" dirty="0" err="1"/>
+              <a:t>dreptul</a:t>
+            </a:r>
+            <a:r>
+              <a:rPr lang="en-US" dirty="0"/>
+              <a:t> </a:t>
+            </a:r>
+            <a:r>
+              <a:rPr lang="en-US" dirty="0" err="1"/>
+              <a:t>unui</a:t>
+            </a:r>
+            <a:r>
+              <a:rPr lang="en-US" dirty="0"/>
+              <a:t> </a:t>
+            </a:r>
+            <a:r>
+              <a:rPr lang="en-US" dirty="0" err="1"/>
+              <a:t>semn</a:t>
+            </a:r>
+            <a:r>
+              <a:rPr lang="en-US" dirty="0"/>
+              <a:t> de stop</a:t>
+            </a:r>
+          </a:p>
+          <a:p>
+            <a:endParaRPr lang="en-US" dirty="0"/>
+          </a:p>
+          <a:p>
+            <a:r>
+              <a:rPr lang="en-US" dirty="0" err="1"/>
+              <a:t>Dac</a:t>
+            </a:r>
+            <a:r>
+              <a:rPr lang="ro-RO" dirty="0"/>
+              <a:t>ă</a:t>
+            </a:r>
+            <a:r>
+              <a:rPr lang="en-US" dirty="0"/>
+              <a:t> </a:t>
             </a:r>
             <a:r>
               <a:rPr lang="en-US" dirty="0" err="1"/>
               <a:t>func</a:t>
             </a:r>
             <a:r>
-              <a:rPr lang="ro-RO" dirty="0" err="1"/>
+              <a:rPr lang="ro-RO" dirty="0"/>
+              <a:t>ţ</a:t>
+            </a:r>
+            <a:r>
+              <a:rPr lang="en-US" dirty="0" err="1"/>
+              <a:t>ia</a:t>
+            </a:r>
+            <a:r>
+              <a:rPr lang="en-US" dirty="0"/>
+              <a:t> </a:t>
+            </a:r>
+            <a:r>
+              <a:rPr lang="en-US" dirty="0" err="1"/>
+              <a:t>detectez</a:t>
+            </a:r>
+            <a:r>
+              <a:rPr lang="ro-RO" dirty="0"/>
+              <a:t>ă</a:t>
+            </a:r>
+            <a:r>
+              <a:rPr lang="en-US" dirty="0"/>
+              <a:t> o </a:t>
+            </a:r>
+            <a:r>
+              <a:rPr lang="en-US" dirty="0" err="1"/>
+              <a:t>linie</a:t>
+            </a:r>
+            <a:r>
+              <a:rPr lang="en-US" dirty="0"/>
+              <a:t> </a:t>
+            </a:r>
+            <a:r>
+              <a:rPr lang="en-US" dirty="0" err="1"/>
+              <a:t>ro</a:t>
+            </a:r>
+            <a:r>
+              <a:rPr lang="ro-RO" dirty="0"/>
+              <a:t>ş</a:t>
+            </a:r>
+            <a:r>
+              <a:rPr lang="en-US" dirty="0" err="1"/>
+              <a:t>ie</a:t>
+            </a:r>
+            <a:r>
+              <a:rPr lang="en-US" dirty="0"/>
+              <a:t> </a:t>
+            </a:r>
+            <a:r>
+              <a:rPr lang="en-US" dirty="0" err="1"/>
+              <a:t>robotul</a:t>
+            </a:r>
+            <a:r>
+              <a:rPr lang="en-US" dirty="0"/>
+              <a:t> o s</a:t>
+            </a:r>
+            <a:r>
+              <a:rPr lang="ro-RO" dirty="0"/>
+              <a:t>ă</a:t>
+            </a:r>
+            <a:r>
+              <a:rPr lang="en-US" dirty="0"/>
+              <a:t> se </a:t>
+            </a:r>
+            <a:r>
+              <a:rPr lang="en-US" dirty="0" err="1"/>
+              <a:t>opreasc</a:t>
+            </a:r>
+            <a:r>
+              <a:rPr lang="ro-RO" dirty="0"/>
+              <a:t>ă</a:t>
+            </a:r>
+            <a:r>
+              <a:rPr lang="en-US" dirty="0"/>
+              <a:t> </a:t>
+            </a:r>
+            <a:r>
+              <a:rPr lang="en-US" dirty="0" err="1"/>
+              <a:t>timp</a:t>
+            </a:r>
+            <a:r>
+              <a:rPr lang="en-US" dirty="0"/>
+              <a:t> de 5 </a:t>
+            </a:r>
+            <a:r>
+              <a:rPr lang="en-US" dirty="0" err="1"/>
+              <a:t>secunde</a:t>
+            </a:r>
+            <a:endParaRPr lang="en-US" dirty="0"/>
+          </a:p>
+          <a:p>
+            <a:endParaRPr lang="en-US" dirty="0"/>
+          </a:p>
+          <a:p>
+            <a:r>
+              <a:rPr lang="en-US" dirty="0" err="1"/>
+              <a:t>Func</a:t>
+            </a:r>
+            <a:r>
+              <a:rPr lang="ro-RO" dirty="0"/>
               <a:t>ţ</a:t>
             </a:r>
             <a:r>
@@ -16306,20 +16860,28 @@
               <a:t> </a:t>
             </a:r>
             <a:r>
-              <a:rPr lang="en-US" dirty="0" err="1"/>
-              <a:t>afi</a:t>
-            </a:r>
-            <a:r>
-              <a:rPr lang="ro-RO" dirty="0" err="1"/>
-              <a:t>şă</a:t>
-            </a:r>
-            <a:r>
-              <a:rPr lang="en-US" dirty="0"/>
-              <a:t>m </a:t>
-            </a:r>
-            <a:r>
-              <a:rPr lang="en-US" dirty="0" err="1"/>
-              <a:t>imaginea</a:t>
+              <a:rPr lang="en-US" dirty="0"/>
+              <a:t>are un </a:t>
+            </a:r>
+            <a:r>
+              <a:rPr lang="en-US" dirty="0" err="1"/>
+              <a:t>mecanism</a:t>
+            </a:r>
+            <a:r>
+              <a:rPr lang="en-US" dirty="0"/>
+              <a:t> de </a:t>
+            </a:r>
+            <a:r>
+              <a:rPr lang="en-US" dirty="0" err="1"/>
+              <a:t>protec</a:t>
+            </a:r>
+            <a:r>
+              <a:rPr lang="ro-RO" dirty="0"/>
+              <a:t>ţ</a:t>
+            </a:r>
+            <a:r>
+              <a:rPr lang="en-US" dirty="0" err="1"/>
+              <a:t>ie</a:t>
             </a:r>
             <a:r>
               <a:rPr lang="en-US" dirty="0"/>
@@ -16327,51 +16889,47 @@
             </a:r>
             <a:r>
               <a:rPr lang="en-US" dirty="0" err="1"/>
-              <a:t>primit</a:t>
+              <a:t>pentru</a:t>
+            </a:r>
+            <a:r>
+              <a:rPr lang="en-US" dirty="0"/>
+              <a:t> a </a:t>
+            </a:r>
+            <a:r>
+              <a:rPr lang="en-US" dirty="0" err="1"/>
+              <a:t>preveni</a:t>
+            </a:r>
+            <a:r>
+              <a:rPr lang="en-US" dirty="0"/>
+              <a:t> </a:t>
+            </a:r>
+            <a:r>
+              <a:rPr lang="en-US" dirty="0" err="1"/>
+              <a:t>oprirea</a:t>
+            </a:r>
+            <a:r>
+              <a:rPr lang="en-US" dirty="0"/>
+              <a:t> </a:t>
+            </a:r>
+            <a:r>
+              <a:rPr lang="en-US" dirty="0" err="1"/>
+              <a:t>robotului</a:t>
+            </a:r>
+            <a:r>
+              <a:rPr lang="en-US" dirty="0"/>
+              <a:t> la </a:t>
+            </a:r>
+            <a:r>
+              <a:rPr lang="en-US" dirty="0" err="1"/>
+              <a:t>acea</a:t>
             </a:r>
             <a:r>
               <a:rPr lang="ro-RO" dirty="0"/>
-              <a:t>ă</a:t>
-            </a:r>
-            <a:r>
-              <a:rPr lang="en-US" dirty="0"/>
-              <a:t> de la robot </a:t>
-            </a:r>
-            <a:r>
-              <a:rPr lang="en-US" dirty="0" err="1"/>
-              <a:t>pentru</a:t>
-            </a:r>
-            <a:r>
-              <a:rPr lang="en-US" dirty="0"/>
-              <a:t> a </a:t>
-            </a:r>
-            <a:r>
-              <a:rPr lang="en-US" dirty="0" err="1"/>
-              <a:t>putea</a:t>
-            </a:r>
-            <a:r>
-              <a:rPr lang="en-US" dirty="0"/>
-              <a:t> in</a:t>
-            </a:r>
-            <a:r>
-              <a:rPr lang="ro-RO" dirty="0" err="1"/>
-              <a:t>ţ</a:t>
-            </a:r>
-            <a:r>
-              <a:rPr lang="en-US" dirty="0" err="1"/>
-              <a:t>elege</a:t>
-            </a:r>
-            <a:r>
-              <a:rPr lang="en-US" dirty="0"/>
-              <a:t> cu u</a:t>
-            </a:r>
-            <a:r>
-              <a:rPr lang="ro-RO" dirty="0" err="1"/>
               <a:t>ş</a:t>
             </a:r>
             <a:r>
               <a:rPr lang="en-US" dirty="0" err="1"/>
-              <a:t>urinta</a:t>
+              <a:t>i</a:t>
             </a:r>
             <a:r>
               <a:rPr lang="en-US" dirty="0"/>
@@ -16379,78 +16937,40 @@
             </a:r>
             <a:r>
               <a:rPr lang="en-US" dirty="0" err="1"/>
-              <a:t>ce</a:t>
-            </a:r>
-            <a:r>
-              <a:rPr lang="en-US" dirty="0"/>
-              <a:t> se </a:t>
-            </a:r>
-            <a:r>
-              <a:rPr lang="ro-RO" dirty="0"/>
-              <a:t>î</a:t>
-            </a:r>
-            <a:r>
-              <a:rPr lang="en-US" dirty="0" err="1"/>
-              <a:t>nt</a:t>
-            </a:r>
-            <a:r>
-              <a:rPr lang="ro-RO" dirty="0"/>
-              <a:t>â</a:t>
-            </a:r>
-            <a:r>
-              <a:rPr lang="en-US" dirty="0" err="1"/>
-              <a:t>mpl</a:t>
-            </a:r>
-            <a:r>
-              <a:rPr lang="ro-RO" dirty="0"/>
-              <a:t>ă</a:t>
-            </a:r>
-            <a:r>
-              <a:rPr lang="en-US" i="1" dirty="0"/>
+              <a:t>linie</a:t>
+            </a:r>
+            <a:r>
+              <a:rPr lang="en-US" dirty="0"/>
+              <a:t> de </a:t>
+            </a:r>
+            <a:r>
+              <a:rPr lang="en-US" dirty="0" err="1"/>
+              <a:t>mai</a:t>
+            </a:r>
+            <a:r>
+              <a:rPr lang="en-US" dirty="0"/>
               <a:t> </a:t>
             </a:r>
             <a:r>
+              <a:rPr lang="en-US" dirty="0" err="1"/>
+              <a:t>multe</a:t>
+            </a:r>
+            <a:r>
               <a:rPr lang="en-US" dirty="0"/>
               <a:t> </a:t>
             </a:r>
-            <a:endParaRPr lang="en-GB" dirty="0"/>
+            <a:r>
+              <a:rPr lang="en-US" dirty="0" err="1"/>
+              <a:t>ori</a:t>
+            </a:r>
+            <a:endParaRPr lang="en-US" dirty="0"/>
           </a:p>
         </p:txBody>
       </p:sp>
-      <p:pic>
-        <p:nvPicPr>
-          <p:cNvPr id="7" name="Imagine 6">
-            <a:extLst>
-              <a:ext uri="{FF2B5EF4-FFF2-40B4-BE49-F238E27FC236}">
-                <a16:creationId xmlns:a16="http://schemas.microsoft.com/office/drawing/2014/main" id="{2EDACAF1-ADBA-04D9-454E-6AAB3E43FC61}"/>
-              </a:ext>
-            </a:extLst>
-          </p:cNvPr>
-          <p:cNvPicPr>
-            <a:picLocks noChangeAspect="1"/>
-          </p:cNvPicPr>
-          <p:nvPr/>
-        </p:nvPicPr>
-        <p:blipFill>
-          <a:blip r:embed="rId2"/>
-          <a:stretch>
-            <a:fillRect/>
-          </a:stretch>
-        </p:blipFill>
-        <p:spPr>
-          <a:xfrm>
-            <a:off x="7784832" y="2166761"/>
-            <a:ext cx="3419952" cy="2524477"/>
-          </a:xfrm>
-          <a:prstGeom prst="rect">
-            <a:avLst/>
-          </a:prstGeom>
-        </p:spPr>
-      </p:pic>
     </p:spTree>
     <p:extLst>
       <p:ext uri="{BB962C8B-B14F-4D97-AF65-F5344CB8AC3E}">
-        <p14:creationId xmlns:p14="http://schemas.microsoft.com/office/powerpoint/2010/main" val="1910569310"/>
+        <p14:creationId xmlns:p14="http://schemas.microsoft.com/office/powerpoint/2010/main" val="3748898753"/>
       </p:ext>
     </p:extLst>
   </p:cSld>

</xml_diff>